<commit_message>
document and slides updated
</commit_message>
<xml_diff>
--- a/Final Report/00172912_AshishPokhrel_CPSlides.pptx
+++ b/Final Report/00172912_AshishPokhrel_CPSlides.pptx
@@ -36,6 +36,7 @@
     <p:sldId id="284" r:id="rId30"/>
     <p:sldId id="285" r:id="rId31"/>
     <p:sldId id="286" r:id="rId32"/>
+    <p:sldId id="287" r:id="rId33"/>
   </p:sldIdLst>
   <p:sldSz cx="12192000" cy="6858000"/>
   <p:notesSz cx="6858000" cy="9144000"/>
@@ -134,6 +135,11 @@
       </a:defRPr>
     </a:lvl9pPr>
   </p:defaultTextStyle>
+  <p:extLst>
+    <p:ext uri="{EFAFB233-063F-42B5-8137-9DF3F51BA10A}">
+      <p15:sldGuideLst xmlns:p15="http://schemas.microsoft.com/office/powerpoint/2012/main"/>
+    </p:ext>
+  </p:extLst>
 </p:presentation>
 </file>
 
@@ -860,7 +866,7 @@
             <a:fld id="{B61BEF0D-F0BB-DE4B-95CE-6DB70DBA9567}" type="datetimeFigureOut">
               <a:rPr lang="en-US" dirty="0"/>
               <a:pPr/>
-              <a:t>4/1/2019</a:t>
+              <a:t>4/2/2019</a:t>
             </a:fld>
             <a:endParaRPr lang="en-US" dirty="0"/>
           </a:p>
@@ -1108,7 +1114,7 @@
             <a:fld id="{B61BEF0D-F0BB-DE4B-95CE-6DB70DBA9567}" type="datetimeFigureOut">
               <a:rPr lang="en-US" dirty="0"/>
               <a:pPr/>
-              <a:t>4/1/2019</a:t>
+              <a:t>4/2/2019</a:t>
             </a:fld>
             <a:endParaRPr lang="en-US" dirty="0"/>
           </a:p>
@@ -1419,7 +1425,7 @@
             <a:fld id="{B61BEF0D-F0BB-DE4B-95CE-6DB70DBA9567}" type="datetimeFigureOut">
               <a:rPr lang="en-US" dirty="0"/>
               <a:pPr/>
-              <a:t>4/1/2019</a:t>
+              <a:t>4/2/2019</a:t>
             </a:fld>
             <a:endParaRPr lang="en-US" dirty="0"/>
           </a:p>
@@ -1757,7 +1763,7 @@
             <a:fld id="{B61BEF0D-F0BB-DE4B-95CE-6DB70DBA9567}" type="datetimeFigureOut">
               <a:rPr lang="en-US" dirty="0"/>
               <a:pPr/>
-              <a:t>4/1/2019</a:t>
+              <a:t>4/2/2019</a:t>
             </a:fld>
             <a:endParaRPr lang="en-US" dirty="0"/>
           </a:p>
@@ -2068,7 +2074,7 @@
             <a:fld id="{B61BEF0D-F0BB-DE4B-95CE-6DB70DBA9567}" type="datetimeFigureOut">
               <a:rPr lang="en-US" dirty="0"/>
               <a:pPr/>
-              <a:t>4/1/2019</a:t>
+              <a:t>4/2/2019</a:t>
             </a:fld>
             <a:endParaRPr lang="en-US" dirty="0"/>
           </a:p>
@@ -2458,7 +2464,7 @@
             <a:fld id="{B61BEF0D-F0BB-DE4B-95CE-6DB70DBA9567}" type="datetimeFigureOut">
               <a:rPr lang="en-US" dirty="0"/>
               <a:pPr/>
-              <a:t>4/1/2019</a:t>
+              <a:t>4/2/2019</a:t>
             </a:fld>
             <a:endParaRPr lang="en-US" dirty="0"/>
           </a:p>
@@ -2624,7 +2630,7 @@
           <a:p>
             <a:fld id="{55C6B4A9-1611-4792-9094-5F34BCA07E0B}" type="datetimeFigureOut">
               <a:rPr lang="en-US" dirty="0"/>
-              <a:t>4/1/2019</a:t>
+              <a:t>4/2/2019</a:t>
             </a:fld>
             <a:endParaRPr lang="en-US" dirty="0"/>
           </a:p>
@@ -2800,7 +2806,7 @@
             <a:fld id="{B61BEF0D-F0BB-DE4B-95CE-6DB70DBA9567}" type="datetimeFigureOut">
               <a:rPr lang="en-US" dirty="0"/>
               <a:pPr/>
-              <a:t>4/1/2019</a:t>
+              <a:t>4/2/2019</a:t>
             </a:fld>
             <a:endParaRPr lang="en-US" dirty="0"/>
           </a:p>
@@ -2973,7 +2979,7 @@
             <a:fld id="{B61BEF0D-F0BB-DE4B-95CE-6DB70DBA9567}" type="datetimeFigureOut">
               <a:rPr lang="en-US" dirty="0"/>
               <a:pPr/>
-              <a:t>4/1/2019</a:t>
+              <a:t>4/2/2019</a:t>
             </a:fld>
             <a:endParaRPr lang="en-US" dirty="0"/>
           </a:p>
@@ -3217,7 +3223,7 @@
             <a:fld id="{B61BEF0D-F0BB-DE4B-95CE-6DB70DBA9567}" type="datetimeFigureOut">
               <a:rPr lang="en-US" dirty="0"/>
               <a:pPr/>
-              <a:t>4/1/2019</a:t>
+              <a:t>4/2/2019</a:t>
             </a:fld>
             <a:endParaRPr lang="en-US" dirty="0"/>
           </a:p>
@@ -3445,7 +3451,7 @@
           <a:p>
             <a:fld id="{EB712588-04B1-427B-82EE-E8DB90309F08}" type="datetimeFigureOut">
               <a:rPr lang="en-US" dirty="0"/>
-              <a:t>4/1/2019</a:t>
+              <a:t>4/2/2019</a:t>
             </a:fld>
             <a:endParaRPr lang="en-US" dirty="0"/>
           </a:p>
@@ -3815,7 +3821,7 @@
             <a:fld id="{B61BEF0D-F0BB-DE4B-95CE-6DB70DBA9567}" type="datetimeFigureOut">
               <a:rPr lang="en-US" dirty="0"/>
               <a:pPr/>
-              <a:t>4/1/2019</a:t>
+              <a:t>4/2/2019</a:t>
             </a:fld>
             <a:endParaRPr lang="en-US" dirty="0"/>
           </a:p>
@@ -3935,7 +3941,7 @@
             <a:fld id="{B61BEF0D-F0BB-DE4B-95CE-6DB70DBA9567}" type="datetimeFigureOut">
               <a:rPr lang="en-US" dirty="0"/>
               <a:pPr/>
-              <a:t>4/1/2019</a:t>
+              <a:t>4/2/2019</a:t>
             </a:fld>
             <a:endParaRPr lang="en-US" dirty="0"/>
           </a:p>
@@ -4027,7 +4033,7 @@
             <a:fld id="{B61BEF0D-F0BB-DE4B-95CE-6DB70DBA9567}" type="datetimeFigureOut">
               <a:rPr lang="en-US" dirty="0"/>
               <a:pPr/>
-              <a:t>4/1/2019</a:t>
+              <a:t>4/2/2019</a:t>
             </a:fld>
             <a:endParaRPr lang="en-US" dirty="0"/>
           </a:p>
@@ -4278,7 +4284,7 @@
           <a:p>
             <a:fld id="{42A54C80-263E-416B-A8E0-580EDEADCBDC}" type="datetimeFigureOut">
               <a:rPr lang="en-US" dirty="0"/>
-              <a:t>4/1/2019</a:t>
+              <a:t>4/2/2019</a:t>
             </a:fld>
             <a:endParaRPr lang="en-US" dirty="0"/>
           </a:p>
@@ -4537,7 +4543,7 @@
             <a:fld id="{B61BEF0D-F0BB-DE4B-95CE-6DB70DBA9567}" type="datetimeFigureOut">
               <a:rPr lang="en-US" dirty="0"/>
               <a:pPr/>
-              <a:t>4/1/2019</a:t>
+              <a:t>4/2/2019</a:t>
             </a:fld>
             <a:endParaRPr lang="en-US" dirty="0"/>
           </a:p>
@@ -5277,7 +5283,7 @@
             <a:fld id="{B61BEF0D-F0BB-DE4B-95CE-6DB70DBA9567}" type="datetimeFigureOut">
               <a:rPr lang="en-US" dirty="0"/>
               <a:pPr/>
-              <a:t>4/1/2019</a:t>
+              <a:t>4/2/2019</a:t>
             </a:fld>
             <a:endParaRPr lang="en-US" dirty="0"/>
           </a:p>
@@ -7109,8 +7115,17 @@
           <a:p>
             <a:r>
               <a:rPr lang="en-US" dirty="0"/>
+              <a:t>Online movie Booking System is web portal.</a:t>
+            </a:r>
+          </a:p>
+          <a:p>
+            <a:r>
+              <a:rPr lang="en-US" dirty="0"/>
               <a:t>User can  book movie ticket from web browser.</a:t>
             </a:r>
+          </a:p>
+          <a:p>
+            <a:endParaRPr lang="en-US" dirty="0"/>
           </a:p>
           <a:p>
             <a:r>
@@ -8103,7 +8118,33 @@
           <a:bodyPr/>
           <a:lstStyle/>
           <a:p>
-            <a:endParaRPr lang="en-US"/>
+            <a:r>
+              <a:rPr lang="en-US" dirty="0"/>
+              <a:t>Chances of duplication of Ticket.</a:t>
+            </a:r>
+          </a:p>
+          <a:p>
+            <a:r>
+              <a:rPr lang="en-US" dirty="0"/>
+              <a:t>User should sit on long queue.</a:t>
+            </a:r>
+          </a:p>
+          <a:p>
+            <a:r>
+              <a:rPr lang="en-US" dirty="0"/>
+              <a:t>Current </a:t>
+            </a:r>
+            <a:r>
+              <a:rPr lang="en-US"/>
+              <a:t>system is Time </a:t>
+            </a:r>
+            <a:r>
+              <a:rPr lang="en-US" dirty="0"/>
+              <a:t>consuming and complex system</a:t>
+            </a:r>
+          </a:p>
+          <a:p>
+            <a:endParaRPr lang="en-US" dirty="0"/>
           </a:p>
         </p:txBody>
       </p:sp>
@@ -8291,6 +8332,86 @@
     <p:extLst>
       <p:ext uri="{BB962C8B-B14F-4D97-AF65-F5344CB8AC3E}">
         <p14:creationId xmlns:p14="http://schemas.microsoft.com/office/powerpoint/2010/main" val="3748911374"/>
+      </p:ext>
+    </p:extLst>
+  </p:cSld>
+  <p:clrMapOvr>
+    <a:masterClrMapping/>
+  </p:clrMapOvr>
+</p:sld>
+</file>
+
+<file path=ppt/slides/slide32.xml><?xml version="1.0" encoding="utf-8"?>
+<p:sld xmlns:a="http://schemas.openxmlformats.org/drawingml/2006/main" xmlns:r="http://schemas.openxmlformats.org/officeDocument/2006/relationships" xmlns:p="http://schemas.openxmlformats.org/presentationml/2006/main">
+  <p:cSld>
+    <p:spTree>
+      <p:nvGrpSpPr>
+        <p:cNvPr id="1" name=""/>
+        <p:cNvGrpSpPr/>
+        <p:nvPr/>
+      </p:nvGrpSpPr>
+      <p:grpSpPr>
+        <a:xfrm>
+          <a:off x="0" y="0"/>
+          <a:ext cx="0" cy="0"/>
+          <a:chOff x="0" y="0"/>
+          <a:chExt cx="0" cy="0"/>
+        </a:xfrm>
+      </p:grpSpPr>
+      <p:sp>
+        <p:nvSpPr>
+          <p:cNvPr id="2" name="Title 1">
+            <a:extLst>
+              <a:ext uri="{FF2B5EF4-FFF2-40B4-BE49-F238E27FC236}">
+                <a16:creationId xmlns:a16="http://schemas.microsoft.com/office/drawing/2014/main" id="{09050840-2F8B-4F6C-A31F-1C709530B208}"/>
+              </a:ext>
+            </a:extLst>
+          </p:cNvPr>
+          <p:cNvSpPr>
+            <a:spLocks noGrp="1"/>
+          </p:cNvSpPr>
+          <p:nvPr>
+            <p:ph type="title"/>
+          </p:nvPr>
+        </p:nvSpPr>
+        <p:spPr/>
+        <p:txBody>
+          <a:bodyPr/>
+          <a:lstStyle/>
+          <a:p>
+            <a:endParaRPr lang="en-US"/>
+          </a:p>
+        </p:txBody>
+      </p:sp>
+      <p:sp>
+        <p:nvSpPr>
+          <p:cNvPr id="3" name="Content Placeholder 2">
+            <a:extLst>
+              <a:ext uri="{FF2B5EF4-FFF2-40B4-BE49-F238E27FC236}">
+                <a16:creationId xmlns:a16="http://schemas.microsoft.com/office/drawing/2014/main" id="{456ABC56-FA02-4FCA-A21D-D2D1E3A3EFD1}"/>
+              </a:ext>
+            </a:extLst>
+          </p:cNvPr>
+          <p:cNvSpPr>
+            <a:spLocks noGrp="1"/>
+          </p:cNvSpPr>
+          <p:nvPr>
+            <p:ph idx="1"/>
+          </p:nvPr>
+        </p:nvSpPr>
+        <p:spPr/>
+        <p:txBody>
+          <a:bodyPr/>
+          <a:lstStyle/>
+          <a:p>
+            <a:endParaRPr lang="en-US"/>
+          </a:p>
+        </p:txBody>
+      </p:sp>
+    </p:spTree>
+    <p:extLst>
+      <p:ext uri="{BB962C8B-B14F-4D97-AF65-F5344CB8AC3E}">
+        <p14:creationId xmlns:p14="http://schemas.microsoft.com/office/powerpoint/2010/main" val="4163025886"/>
       </p:ext>
     </p:extLst>
   </p:cSld>

</xml_diff>